<commit_message>
fix bug in image path
</commit_message>
<xml_diff>
--- a/out.pptx
+++ b/out.pptx
@@ -3223,6 +3223,54 @@
           </a:p>
         </p:txBody>
       </p:sp>
+      <p:pic>
+        <p:nvPicPr>
+          <p:cNvPr id="4" name="Picture 3" descr="img1.PNG"/>
+          <p:cNvPicPr>
+            <a:picLocks noChangeAspect="1"/>
+          </p:cNvPicPr>
+          <p:nvPr/>
+        </p:nvPicPr>
+        <p:blipFill>
+          <a:blip r:embed="rId2"/>
+          <a:stretch>
+            <a:fillRect/>
+          </a:stretch>
+        </p:blipFill>
+        <p:spPr>
+          <a:xfrm>
+            <a:off x="450000" y="4644000"/>
+            <a:ext cx="2088000" cy="1417351"/>
+          </a:xfrm>
+          <a:prstGeom prst="rect">
+            <a:avLst/>
+          </a:prstGeom>
+        </p:spPr>
+      </p:pic>
+      <p:pic>
+        <p:nvPicPr>
+          <p:cNvPr id="5" name="Picture 4" descr="img2.PNG"/>
+          <p:cNvPicPr>
+            <a:picLocks noChangeAspect="1"/>
+          </p:cNvPicPr>
+          <p:nvPr/>
+        </p:nvPicPr>
+        <p:blipFill>
+          <a:blip r:embed="rId3"/>
+          <a:stretch>
+            <a:fillRect/>
+          </a:stretch>
+        </p:blipFill>
+        <p:spPr>
+          <a:xfrm>
+            <a:off x="2538000" y="4644000"/>
+            <a:ext cx="2088000" cy="1698932"/>
+          </a:xfrm>
+          <a:prstGeom prst="rect">
+            <a:avLst/>
+          </a:prstGeom>
+        </p:spPr>
+      </p:pic>
     </p:spTree>
   </p:cSld>
   <p:clrMapOvr>

</xml_diff>